<commit_message>
Complete RMSProp with Momentum tuning. Note added with best result parameters. Start testing for graph outputs.
</commit_message>
<xml_diff>
--- a/Spring 2018/Design and Analysis of Algorithms/Research Project/Presentation/Presentation.pptx
+++ b/Spring 2018/Design and Analysis of Algorithms/Research Project/Presentation/Presentation.pptx
@@ -224,7 +224,7 @@
           <a:p>
             <a:fld id="{1AF5F2FE-A072-4B3D-B491-0B04188A9056}" type="datetimeFigureOut">
               <a:rPr lang="en-US" smtClean="0"/>
-              <a:t>4/8/2018</a:t>
+              <a:t>4/9/2018</a:t>
             </a:fld>
             <a:endParaRPr lang="en-US"/>
           </a:p>
@@ -638,7 +638,7 @@
           <a:p>
             <a:fld id="{356611C6-332D-4C37-96E2-7F97A9BDB931}" type="datetime1">
               <a:rPr lang="en-US" smtClean="0"/>
-              <a:t>4/8/2018</a:t>
+              <a:t>4/9/2018</a:t>
             </a:fld>
             <a:endParaRPr lang="en-US"/>
           </a:p>
@@ -839,7 +839,7 @@
           <a:p>
             <a:fld id="{890E92DC-ED22-401B-A242-83B488FECE37}" type="datetime1">
               <a:rPr lang="en-US" smtClean="0"/>
-              <a:t>4/8/2018</a:t>
+              <a:t>4/9/2018</a:t>
             </a:fld>
             <a:endParaRPr lang="en-US"/>
           </a:p>
@@ -1050,7 +1050,7 @@
           <a:p>
             <a:fld id="{5BEB23B3-45B8-4CE9-8C52-9138CEE1E9EF}" type="datetime1">
               <a:rPr lang="en-US" smtClean="0"/>
-              <a:t>4/8/2018</a:t>
+              <a:t>4/9/2018</a:t>
             </a:fld>
             <a:endParaRPr lang="en-US"/>
           </a:p>
@@ -1251,7 +1251,7 @@
           <a:p>
             <a:fld id="{053CA760-026A-489D-9E74-9CCF3C6DEE0C}" type="datetime1">
               <a:rPr lang="en-US" smtClean="0"/>
-              <a:t>4/8/2018</a:t>
+              <a:t>4/9/2018</a:t>
             </a:fld>
             <a:endParaRPr lang="en-US"/>
           </a:p>
@@ -1529,7 +1529,7 @@
           <a:p>
             <a:fld id="{DC6D2640-87FF-4693-B2B0-0B4CAD60287C}" type="datetime1">
               <a:rPr lang="en-US" smtClean="0"/>
-              <a:t>4/8/2018</a:t>
+              <a:t>4/9/2018</a:t>
             </a:fld>
             <a:endParaRPr lang="en-US"/>
           </a:p>
@@ -1797,7 +1797,7 @@
           <a:p>
             <a:fld id="{164F4055-43CA-4CE7-A484-D7CC557BB876}" type="datetime1">
               <a:rPr lang="en-US" smtClean="0"/>
-              <a:t>4/8/2018</a:t>
+              <a:t>4/9/2018</a:t>
             </a:fld>
             <a:endParaRPr lang="en-US"/>
           </a:p>
@@ -2212,7 +2212,7 @@
           <a:p>
             <a:fld id="{037B43AA-982F-44D8-B3D2-8D615616B05E}" type="datetime1">
               <a:rPr lang="en-US" smtClean="0"/>
-              <a:t>4/8/2018</a:t>
+              <a:t>4/9/2018</a:t>
             </a:fld>
             <a:endParaRPr lang="en-US"/>
           </a:p>
@@ -2356,7 +2356,7 @@
           <a:p>
             <a:fld id="{290F3D94-C5C7-4AD0-83FC-12861A3AEF61}" type="datetime1">
               <a:rPr lang="en-US" smtClean="0"/>
-              <a:t>4/8/2018</a:t>
+              <a:t>4/9/2018</a:t>
             </a:fld>
             <a:endParaRPr lang="en-US"/>
           </a:p>
@@ -2472,7 +2472,7 @@
           <a:p>
             <a:fld id="{3E338E03-ACBA-4F33-A4F8-611E20B19206}" type="datetime1">
               <a:rPr lang="en-US" smtClean="0"/>
-              <a:t>4/8/2018</a:t>
+              <a:t>4/9/2018</a:t>
             </a:fld>
             <a:endParaRPr lang="en-US"/>
           </a:p>
@@ -2786,7 +2786,7 @@
           <a:p>
             <a:fld id="{88A2276F-E918-4C9F-A85C-4232C1481B3B}" type="datetime1">
               <a:rPr lang="en-US" smtClean="0"/>
-              <a:t>4/8/2018</a:t>
+              <a:t>4/9/2018</a:t>
             </a:fld>
             <a:endParaRPr lang="en-US"/>
           </a:p>
@@ -3077,7 +3077,7 @@
           <a:p>
             <a:fld id="{79823708-8AB9-4BBA-B9DC-81308311464A}" type="datetime1">
               <a:rPr lang="en-US" smtClean="0"/>
-              <a:t>4/8/2018</a:t>
+              <a:t>4/9/2018</a:t>
             </a:fld>
             <a:endParaRPr lang="en-US"/>
           </a:p>
@@ -3321,7 +3321,7 @@
           <a:p>
             <a:fld id="{17E25D1E-AC31-449E-9158-6677BC818810}" type="datetime1">
               <a:rPr lang="en-US" smtClean="0"/>
-              <a:t>4/8/2018</a:t>
+              <a:t>4/9/2018</a:t>
             </a:fld>
             <a:endParaRPr lang="en-US"/>
           </a:p>
@@ -6110,6 +6110,236 @@
               </a:rPr>
               <a:t>Design &amp; Analysis of Algorithms Spring 2018</a:t>
             </a:r>
+          </a:p>
+        </p:txBody>
+      </p:sp>
+      <p:sp>
+        <p:nvSpPr>
+          <p:cNvPr id="6" name="TextBox 5">
+            <a:extLst>
+              <a:ext uri="{FF2B5EF4-FFF2-40B4-BE49-F238E27FC236}">
+                <a16:creationId xmlns:a16="http://schemas.microsoft.com/office/drawing/2014/main" id="{C5E533CA-409C-4897-AA00-B09016DAC766}"/>
+              </a:ext>
+            </a:extLst>
+          </p:cNvPr>
+          <p:cNvSpPr txBox="1"/>
+          <p:nvPr/>
+        </p:nvSpPr>
+        <p:spPr>
+          <a:xfrm>
+            <a:off x="382554" y="470582"/>
+            <a:ext cx="4609323" cy="584775"/>
+          </a:xfrm>
+          <a:prstGeom prst="rect">
+            <a:avLst/>
+          </a:prstGeom>
+          <a:noFill/>
+        </p:spPr>
+        <p:txBody>
+          <a:bodyPr wrap="square" rtlCol="0">
+            <a:spAutoFit/>
+          </a:bodyPr>
+          <a:lstStyle/>
+          <a:p>
+            <a:r>
+              <a:rPr lang="en-US" sz="3200" dirty="0"/>
+              <a:t>Sources:</a:t>
+            </a:r>
+            <a:endParaRPr lang="en-US" sz="2800" dirty="0"/>
+          </a:p>
+        </p:txBody>
+      </p:sp>
+      <p:sp>
+        <p:nvSpPr>
+          <p:cNvPr id="8" name="TextBox 7">
+            <a:extLst>
+              <a:ext uri="{FF2B5EF4-FFF2-40B4-BE49-F238E27FC236}">
+                <a16:creationId xmlns:a16="http://schemas.microsoft.com/office/drawing/2014/main" id="{0F3F298F-7F58-45E4-86E5-7188F1EB3EA7}"/>
+              </a:ext>
+            </a:extLst>
+          </p:cNvPr>
+          <p:cNvSpPr txBox="1"/>
+          <p:nvPr/>
+        </p:nvSpPr>
+        <p:spPr>
+          <a:xfrm>
+            <a:off x="1219200" y="1371600"/>
+            <a:ext cx="9982200" cy="4893647"/>
+          </a:xfrm>
+          <a:prstGeom prst="rect">
+            <a:avLst/>
+          </a:prstGeom>
+          <a:noFill/>
+        </p:spPr>
+        <p:txBody>
+          <a:bodyPr wrap="square" rtlCol="0">
+            <a:spAutoFit/>
+          </a:bodyPr>
+          <a:lstStyle/>
+          <a:p>
+            <a:r>
+              <a:rPr lang="en-US" sz="1200" b="1" dirty="0"/>
+              <a:t>Neural Network Basics</a:t>
+            </a:r>
+          </a:p>
+          <a:p>
+            <a:r>
+              <a:rPr lang="en-US" sz="1200" dirty="0"/>
+              <a:t>http://neuralnetworksanddeeplearning.com</a:t>
+            </a:r>
+          </a:p>
+          <a:p>
+            <a:r>
+              <a:rPr lang="en-US" sz="1200" dirty="0"/>
+              <a:t>https://github.com/stephencwelch/Neural-Networks-Demystified</a:t>
+            </a:r>
+          </a:p>
+          <a:p>
+            <a:r>
+              <a:rPr lang="en-US" sz="1200" dirty="0"/>
+              <a:t>https://wiseodd.github.io</a:t>
+            </a:r>
+          </a:p>
+          <a:p>
+            <a:endParaRPr lang="en-US" sz="1200" dirty="0"/>
+          </a:p>
+          <a:p>
+            <a:r>
+              <a:rPr lang="en-US" sz="1200" b="1" dirty="0"/>
+              <a:t>Backpropagation</a:t>
+            </a:r>
+          </a:p>
+          <a:p>
+            <a:r>
+              <a:rPr lang="en-US" sz="1200" dirty="0"/>
+              <a:t>https://mattmazur.com/2015/03/17/a-step-by-step-backpropagation-example/</a:t>
+            </a:r>
+          </a:p>
+          <a:p>
+            <a:endParaRPr lang="en-US" sz="1200"/>
+          </a:p>
+          <a:p>
+            <a:r>
+              <a:rPr lang="en-US" sz="1200"/>
+              <a:t>Jahangir</a:t>
+            </a:r>
+            <a:r>
+              <a:rPr lang="en-US" sz="1200" dirty="0"/>
+              <a:t>, Mostafa, et al. “Design of a Fast Convergent Backpropagation Algorithm Based on Optimal Control Theory.” </a:t>
+            </a:r>
+            <a:r>
+              <a:rPr lang="en-US" sz="1200" i="1" dirty="0"/>
+              <a:t>Nonlinear Dynamics</a:t>
+            </a:r>
+            <a:r>
+              <a:rPr lang="en-US" sz="1200" dirty="0"/>
+              <a:t>, vol. 70, no. 2, 2012, pp. 1051–1059., doi:10.1007/s11071-012-0512-1.</a:t>
+            </a:r>
+          </a:p>
+          <a:p>
+            <a:r>
+              <a:rPr lang="en-US" sz="1200" dirty="0"/>
+              <a:t>International Journal of Soft Computing and Engineering (IJSCE)</a:t>
+            </a:r>
+          </a:p>
+          <a:p>
+            <a:r>
+              <a:rPr lang="en-US" sz="1200" dirty="0"/>
+              <a:t>ISSN: 2231-2307, Volume-1, Issue-1, March 2011</a:t>
+            </a:r>
+          </a:p>
+          <a:p>
+            <a:endParaRPr lang="en-US" sz="1200" dirty="0"/>
+          </a:p>
+          <a:p>
+            <a:r>
+              <a:rPr lang="en-US" sz="1200" dirty="0"/>
+              <a:t>Hashem, </a:t>
+            </a:r>
+            <a:r>
+              <a:rPr lang="en-US" sz="1200" dirty="0" err="1"/>
+              <a:t>Tahsina</a:t>
+            </a:r>
+            <a:r>
+              <a:rPr lang="en-US" sz="1200" dirty="0"/>
+              <a:t>, et al. “Handwritten Bangla Digit Recognition Employing Hybrid Neural Network Approach.” </a:t>
+            </a:r>
+            <a:r>
+              <a:rPr lang="en-US" sz="1200" i="1" dirty="0"/>
+              <a:t>16th Int'l Conf. Computer and Information Technology</a:t>
+            </a:r>
+            <a:r>
+              <a:rPr lang="en-US" sz="1200" dirty="0"/>
+              <a:t>, 2014, doi:10.1109/iccitechn.2014.6997353.</a:t>
+            </a:r>
+          </a:p>
+          <a:p>
+            <a:endParaRPr lang="en-US" sz="1200" dirty="0"/>
+          </a:p>
+          <a:p>
+            <a:r>
+              <a:rPr lang="en-US" sz="1200" dirty="0" err="1"/>
+              <a:t>Lecun</a:t>
+            </a:r>
+            <a:r>
+              <a:rPr lang="en-US" sz="1200" dirty="0"/>
+              <a:t>, Yann A., et al. “Efficient </a:t>
+            </a:r>
+            <a:r>
+              <a:rPr lang="en-US" sz="1200" dirty="0" err="1"/>
+              <a:t>BackProp</a:t>
+            </a:r>
+            <a:r>
+              <a:rPr lang="en-US" sz="1200" dirty="0"/>
+              <a:t>.” </a:t>
+            </a:r>
+            <a:r>
+              <a:rPr lang="en-US" sz="1200" i="1" dirty="0"/>
+              <a:t>Lecture Notes in Computer Science Neural Networks: Tricks of the Trade</a:t>
+            </a:r>
+            <a:r>
+              <a:rPr lang="en-US" sz="1200" dirty="0"/>
+              <a:t>, 2012, pp. 9–48., doi:10.1007/978-3-642-35289-8_3</a:t>
+            </a:r>
+          </a:p>
+          <a:p>
+            <a:endParaRPr lang="en-US" sz="1200" dirty="0"/>
+          </a:p>
+          <a:p>
+            <a:endParaRPr lang="en-US" sz="1200" dirty="0"/>
+          </a:p>
+          <a:p>
+            <a:r>
+              <a:rPr lang="en-US" sz="1200" b="1" dirty="0"/>
+              <a:t>Optimization</a:t>
+            </a:r>
+          </a:p>
+          <a:p>
+            <a:r>
+              <a:rPr lang="en-US" sz="1200" dirty="0"/>
+              <a:t>http://ruder.io/optimizing-gradient-descent/</a:t>
+            </a:r>
+          </a:p>
+          <a:p>
+            <a:r>
+              <a:rPr lang="en-US" sz="1200" dirty="0"/>
+              <a:t>https://towardsdatascience.com/stochastic-gradient-descent-with-momentum-a84097641a5d</a:t>
+            </a:r>
+          </a:p>
+          <a:p>
+            <a:r>
+              <a:rPr lang="en-US" sz="1200" dirty="0"/>
+              <a:t>http://climin.readthedocs.io/en/latest/rmsprop.html</a:t>
+            </a:r>
+          </a:p>
+          <a:p>
+            <a:r>
+              <a:rPr lang="en-US" sz="1200" dirty="0"/>
+              <a:t>http://ruder.io/optimizing-gradient-descent/index.html#nesterovacceleratedgradient</a:t>
+            </a:r>
+          </a:p>
+          <a:p>
+            <a:endParaRPr lang="en-US" sz="1200" dirty="0"/>
           </a:p>
         </p:txBody>
       </p:sp>

</xml_diff>

<commit_message>
Fix typo in ppt
</commit_message>
<xml_diff>
--- a/Spring 2018/Design and Analysis of Algorithms/Research Project/Presentation/Presentation.pptx
+++ b/Spring 2018/Design and Analysis of Algorithms/Research Project/Presentation/Presentation.pptx
@@ -222,7 +222,7 @@
           <a:p>
             <a:fld id="{1AF5F2FE-A072-4B3D-B491-0B04188A9056}" type="datetimeFigureOut">
               <a:rPr lang="en-US" smtClean="0"/>
-              <a:t>4/9/2018</a:t>
+              <a:t>4/10/2018</a:t>
             </a:fld>
             <a:endParaRPr lang="en-US"/>
           </a:p>
@@ -636,7 +636,7 @@
           <a:p>
             <a:fld id="{356611C6-332D-4C37-96E2-7F97A9BDB931}" type="datetime1">
               <a:rPr lang="en-US" smtClean="0"/>
-              <a:t>4/9/2018</a:t>
+              <a:t>4/10/2018</a:t>
             </a:fld>
             <a:endParaRPr lang="en-US"/>
           </a:p>
@@ -837,7 +837,7 @@
           <a:p>
             <a:fld id="{890E92DC-ED22-401B-A242-83B488FECE37}" type="datetime1">
               <a:rPr lang="en-US" smtClean="0"/>
-              <a:t>4/9/2018</a:t>
+              <a:t>4/10/2018</a:t>
             </a:fld>
             <a:endParaRPr lang="en-US"/>
           </a:p>
@@ -1048,7 +1048,7 @@
           <a:p>
             <a:fld id="{5BEB23B3-45B8-4CE9-8C52-9138CEE1E9EF}" type="datetime1">
               <a:rPr lang="en-US" smtClean="0"/>
-              <a:t>4/9/2018</a:t>
+              <a:t>4/10/2018</a:t>
             </a:fld>
             <a:endParaRPr lang="en-US"/>
           </a:p>
@@ -1249,7 +1249,7 @@
           <a:p>
             <a:fld id="{053CA760-026A-489D-9E74-9CCF3C6DEE0C}" type="datetime1">
               <a:rPr lang="en-US" smtClean="0"/>
-              <a:t>4/9/2018</a:t>
+              <a:t>4/10/2018</a:t>
             </a:fld>
             <a:endParaRPr lang="en-US"/>
           </a:p>
@@ -1527,7 +1527,7 @@
           <a:p>
             <a:fld id="{DC6D2640-87FF-4693-B2B0-0B4CAD60287C}" type="datetime1">
               <a:rPr lang="en-US" smtClean="0"/>
-              <a:t>4/9/2018</a:t>
+              <a:t>4/10/2018</a:t>
             </a:fld>
             <a:endParaRPr lang="en-US"/>
           </a:p>
@@ -1795,7 +1795,7 @@
           <a:p>
             <a:fld id="{164F4055-43CA-4CE7-A484-D7CC557BB876}" type="datetime1">
               <a:rPr lang="en-US" smtClean="0"/>
-              <a:t>4/9/2018</a:t>
+              <a:t>4/10/2018</a:t>
             </a:fld>
             <a:endParaRPr lang="en-US"/>
           </a:p>
@@ -2210,7 +2210,7 @@
           <a:p>
             <a:fld id="{037B43AA-982F-44D8-B3D2-8D615616B05E}" type="datetime1">
               <a:rPr lang="en-US" smtClean="0"/>
-              <a:t>4/9/2018</a:t>
+              <a:t>4/10/2018</a:t>
             </a:fld>
             <a:endParaRPr lang="en-US"/>
           </a:p>
@@ -2354,7 +2354,7 @@
           <a:p>
             <a:fld id="{290F3D94-C5C7-4AD0-83FC-12861A3AEF61}" type="datetime1">
               <a:rPr lang="en-US" smtClean="0"/>
-              <a:t>4/9/2018</a:t>
+              <a:t>4/10/2018</a:t>
             </a:fld>
             <a:endParaRPr lang="en-US"/>
           </a:p>
@@ -2470,7 +2470,7 @@
           <a:p>
             <a:fld id="{3E338E03-ACBA-4F33-A4F8-611E20B19206}" type="datetime1">
               <a:rPr lang="en-US" smtClean="0"/>
-              <a:t>4/9/2018</a:t>
+              <a:t>4/10/2018</a:t>
             </a:fld>
             <a:endParaRPr lang="en-US"/>
           </a:p>
@@ -2784,7 +2784,7 @@
           <a:p>
             <a:fld id="{88A2276F-E918-4C9F-A85C-4232C1481B3B}" type="datetime1">
               <a:rPr lang="en-US" smtClean="0"/>
-              <a:t>4/9/2018</a:t>
+              <a:t>4/10/2018</a:t>
             </a:fld>
             <a:endParaRPr lang="en-US"/>
           </a:p>
@@ -3075,7 +3075,7 @@
           <a:p>
             <a:fld id="{79823708-8AB9-4BBA-B9DC-81308311464A}" type="datetime1">
               <a:rPr lang="en-US" smtClean="0"/>
-              <a:t>4/9/2018</a:t>
+              <a:t>4/10/2018</a:t>
             </a:fld>
             <a:endParaRPr lang="en-US"/>
           </a:p>
@@ -3319,7 +3319,7 @@
           <a:p>
             <a:fld id="{17E25D1E-AC31-449E-9158-6677BC818810}" type="datetime1">
               <a:rPr lang="en-US" smtClean="0"/>
-              <a:t>4/9/2018</a:t>
+              <a:t>4/10/2018</a:t>
             </a:fld>
             <a:endParaRPr lang="en-US"/>
           </a:p>
@@ -6034,7 +6034,7 @@
           <p:nvPr>
             <p:extLst>
               <p:ext uri="{D42A27DB-BD31-4B8C-83A1-F6EECF244321}">
-                <p14:modId xmlns:p14="http://schemas.microsoft.com/office/powerpoint/2010/main" val="1873236224"/>
+                <p14:modId xmlns:p14="http://schemas.microsoft.com/office/powerpoint/2010/main" val="3652202054"/>
               </p:ext>
             </p:extLst>
           </p:nvPr>
@@ -6074,7 +6074,7 @@
                       <a:pPr algn="ctr"/>
                       <a:r>
                         <a:rPr lang="en-US" sz="4000" dirty="0"/>
-                        <a:t>SGD</a:t>
+                        <a:t>RMS</a:t>
                       </a:r>
                     </a:p>
                   </a:txBody>
@@ -6088,7 +6088,7 @@
                       <a:pPr algn="ctr"/>
                       <a:r>
                         <a:rPr lang="en-US" sz="4000" dirty="0"/>
-                        <a:t>RMS</a:t>
+                        <a:t>SGD</a:t>
                       </a:r>
                     </a:p>
                   </a:txBody>

</xml_diff>